<commit_message>
Updated pitch alpha PowerPoint 05.03.18
Following group jam meeting, revised presentation.
</commit_message>
<xml_diff>
--- a/Pitch Presentations/Second Pitch Template.pptx
+++ b/Pitch Presentations/Second Pitch Template.pptx
@@ -8,10 +8,12 @@
     <p:sldId id="256" r:id="rId2"/>
     <p:sldId id="257" r:id="rId3"/>
     <p:sldId id="258" r:id="rId4"/>
-    <p:sldId id="260" r:id="rId5"/>
-    <p:sldId id="259" r:id="rId6"/>
-    <p:sldId id="261" r:id="rId7"/>
-    <p:sldId id="262" r:id="rId8"/>
+    <p:sldId id="263" r:id="rId5"/>
+    <p:sldId id="260" r:id="rId6"/>
+    <p:sldId id="259" r:id="rId7"/>
+    <p:sldId id="264" r:id="rId8"/>
+    <p:sldId id="261" r:id="rId9"/>
+    <p:sldId id="262" r:id="rId10"/>
   </p:sldIdLst>
   <p:sldSz cx="12192000" cy="6858000"/>
   <p:notesSz cx="6858000" cy="9144000"/>
@@ -110,7 +112,16 @@
       </a:defRPr>
     </a:lvl9pPr>
   </p:defaultTextStyle>
+  <p:extLst>
+    <p:ext uri="{EFAFB233-063F-42B5-8137-9DF3F51BA10A}">
+      <p15:sldGuideLst xmlns:p15="http://schemas.microsoft.com/office/powerpoint/2012/main"/>
+    </p:ext>
+  </p:extLst>
 </p:presentation>
+</file>
+
+<file path=ppt/revisionInfo.xml><?xml version="1.0" encoding="utf-8"?>
+<p1510:revInfo xmlns:a="http://schemas.openxmlformats.org/drawingml/2006/main" xmlns:r="http://schemas.openxmlformats.org/officeDocument/2006/relationships" xmlns:p1510="http://schemas.microsoft.com/office/powerpoint/2015/10/main"/>
 </file>
 
 <file path=ppt/slideLayouts/slideLayout1.xml><?xml version="1.0" encoding="utf-8"?>
@@ -262,7 +273,7 @@
           <a:p>
             <a:fld id="{1C477840-8EB3-4E86-97CC-2AA85FB80F29}" type="datetimeFigureOut">
               <a:rPr lang="en-GB" smtClean="0"/>
-              <a:t>02/03/2018</a:t>
+              <a:t>05/03/2018</a:t>
             </a:fld>
             <a:endParaRPr lang="en-GB"/>
           </a:p>
@@ -462,7 +473,7 @@
           <a:p>
             <a:fld id="{1C477840-8EB3-4E86-97CC-2AA85FB80F29}" type="datetimeFigureOut">
               <a:rPr lang="en-GB" smtClean="0"/>
-              <a:t>02/03/2018</a:t>
+              <a:t>05/03/2018</a:t>
             </a:fld>
             <a:endParaRPr lang="en-GB"/>
           </a:p>
@@ -672,7 +683,7 @@
           <a:p>
             <a:fld id="{1C477840-8EB3-4E86-97CC-2AA85FB80F29}" type="datetimeFigureOut">
               <a:rPr lang="en-GB" smtClean="0"/>
-              <a:t>02/03/2018</a:t>
+              <a:t>05/03/2018</a:t>
             </a:fld>
             <a:endParaRPr lang="en-GB"/>
           </a:p>
@@ -872,7 +883,7 @@
           <a:p>
             <a:fld id="{1C477840-8EB3-4E86-97CC-2AA85FB80F29}" type="datetimeFigureOut">
               <a:rPr lang="en-GB" smtClean="0"/>
-              <a:t>02/03/2018</a:t>
+              <a:t>05/03/2018</a:t>
             </a:fld>
             <a:endParaRPr lang="en-GB"/>
           </a:p>
@@ -1148,7 +1159,7 @@
           <a:p>
             <a:fld id="{1C477840-8EB3-4E86-97CC-2AA85FB80F29}" type="datetimeFigureOut">
               <a:rPr lang="en-GB" smtClean="0"/>
-              <a:t>02/03/2018</a:t>
+              <a:t>05/03/2018</a:t>
             </a:fld>
             <a:endParaRPr lang="en-GB"/>
           </a:p>
@@ -1416,7 +1427,7 @@
           <a:p>
             <a:fld id="{1C477840-8EB3-4E86-97CC-2AA85FB80F29}" type="datetimeFigureOut">
               <a:rPr lang="en-GB" smtClean="0"/>
-              <a:t>02/03/2018</a:t>
+              <a:t>05/03/2018</a:t>
             </a:fld>
             <a:endParaRPr lang="en-GB"/>
           </a:p>
@@ -1831,7 +1842,7 @@
           <a:p>
             <a:fld id="{1C477840-8EB3-4E86-97CC-2AA85FB80F29}" type="datetimeFigureOut">
               <a:rPr lang="en-GB" smtClean="0"/>
-              <a:t>02/03/2018</a:t>
+              <a:t>05/03/2018</a:t>
             </a:fld>
             <a:endParaRPr lang="en-GB"/>
           </a:p>
@@ -1973,7 +1984,7 @@
           <a:p>
             <a:fld id="{1C477840-8EB3-4E86-97CC-2AA85FB80F29}" type="datetimeFigureOut">
               <a:rPr lang="en-GB" smtClean="0"/>
-              <a:t>02/03/2018</a:t>
+              <a:t>05/03/2018</a:t>
             </a:fld>
             <a:endParaRPr lang="en-GB"/>
           </a:p>
@@ -2086,7 +2097,7 @@
           <a:p>
             <a:fld id="{1C477840-8EB3-4E86-97CC-2AA85FB80F29}" type="datetimeFigureOut">
               <a:rPr lang="en-GB" smtClean="0"/>
-              <a:t>02/03/2018</a:t>
+              <a:t>05/03/2018</a:t>
             </a:fld>
             <a:endParaRPr lang="en-GB"/>
           </a:p>
@@ -2399,7 +2410,7 @@
           <a:p>
             <a:fld id="{1C477840-8EB3-4E86-97CC-2AA85FB80F29}" type="datetimeFigureOut">
               <a:rPr lang="en-GB" smtClean="0"/>
-              <a:t>02/03/2018</a:t>
+              <a:t>05/03/2018</a:t>
             </a:fld>
             <a:endParaRPr lang="en-GB"/>
           </a:p>
@@ -2688,7 +2699,7 @@
           <a:p>
             <a:fld id="{1C477840-8EB3-4E86-97CC-2AA85FB80F29}" type="datetimeFigureOut">
               <a:rPr lang="en-GB" smtClean="0"/>
-              <a:t>02/03/2018</a:t>
+              <a:t>05/03/2018</a:t>
             </a:fld>
             <a:endParaRPr lang="en-GB"/>
           </a:p>
@@ -2931,7 +2942,7 @@
           <a:p>
             <a:fld id="{1C477840-8EB3-4E86-97CC-2AA85FB80F29}" type="datetimeFigureOut">
               <a:rPr lang="en-GB" smtClean="0"/>
-              <a:t>02/03/2018</a:t>
+              <a:t>05/03/2018</a:t>
             </a:fld>
             <a:endParaRPr lang="en-GB"/>
           </a:p>
@@ -3486,55 +3497,22 @@
       </p:sp>
       <p:sp>
         <p:nvSpPr>
-          <p:cNvPr id="3" name="Content Placeholder 2">
-            <a:extLst>
-              <a:ext uri="{FF2B5EF4-FFF2-40B4-BE49-F238E27FC236}">
-                <a16:creationId xmlns:a16="http://schemas.microsoft.com/office/drawing/2014/main" id="{8664E946-D3BF-434F-8002-6F1F5F811A40}"/>
-              </a:ext>
-            </a:extLst>
-          </p:cNvPr>
-          <p:cNvSpPr>
-            <a:spLocks noGrp="1"/>
-          </p:cNvSpPr>
-          <p:nvPr>
-            <p:ph idx="1"/>
-          </p:nvPr>
+          <p:cNvPr id="4" name="Content Placeholder 2">
+            <a:extLst>
+              <a:ext uri="{FF2B5EF4-FFF2-40B4-BE49-F238E27FC236}">
+                <a16:creationId xmlns:a16="http://schemas.microsoft.com/office/drawing/2014/main" id="{2A114BE0-21ED-462F-89E0-FD940BB137B1}"/>
+              </a:ext>
+            </a:extLst>
+          </p:cNvPr>
+          <p:cNvSpPr txBox="1">
+            <a:spLocks/>
+          </p:cNvSpPr>
+          <p:nvPr/>
         </p:nvSpPr>
         <p:spPr>
           <a:xfrm>
-            <a:off x="838200" y="1825625"/>
-            <a:ext cx="3289183" cy="4351338"/>
-          </a:xfrm>
-        </p:spPr>
-        <p:txBody>
-          <a:bodyPr/>
-          <a:lstStyle/>
-          <a:p>
-            <a:r>
-              <a:rPr lang="en-GB" dirty="0"/>
-              <a:t>*Screenshot of most recent build*</a:t>
-            </a:r>
-          </a:p>
-        </p:txBody>
-      </p:sp>
-      <p:sp>
-        <p:nvSpPr>
-          <p:cNvPr id="4" name="Content Placeholder 2">
-            <a:extLst>
-              <a:ext uri="{FF2B5EF4-FFF2-40B4-BE49-F238E27FC236}">
-                <a16:creationId xmlns:a16="http://schemas.microsoft.com/office/drawing/2014/main" id="{2A114BE0-21ED-462F-89E0-FD940BB137B1}"/>
-              </a:ext>
-            </a:extLst>
-          </p:cNvPr>
-          <p:cNvSpPr txBox="1">
-            <a:spLocks/>
-          </p:cNvSpPr>
-          <p:nvPr/>
-        </p:nvSpPr>
-        <p:spPr>
-          <a:xfrm>
-            <a:off x="4918046" y="1825625"/>
-            <a:ext cx="6435754" cy="4351338"/>
+            <a:off x="7430034" y="771504"/>
+            <a:ext cx="3419064" cy="2147224"/>
           </a:xfrm>
           <a:prstGeom prst="rect">
             <a:avLst/>
@@ -3716,6 +3694,277 @@
           </a:p>
         </p:txBody>
       </p:sp>
+      <p:pic>
+        <p:nvPicPr>
+          <p:cNvPr id="11" name="Picture 10">
+            <a:extLst>
+              <a:ext uri="{FF2B5EF4-FFF2-40B4-BE49-F238E27FC236}">
+                <a16:creationId xmlns:a16="http://schemas.microsoft.com/office/drawing/2014/main" id="{1E682DD8-B8FE-43C7-BA29-C3E361DD125E}"/>
+              </a:ext>
+            </a:extLst>
+          </p:cNvPr>
+          <p:cNvPicPr>
+            <a:picLocks noChangeAspect="1"/>
+          </p:cNvPicPr>
+          <p:nvPr/>
+        </p:nvPicPr>
+        <p:blipFill>
+          <a:blip r:embed="rId2"/>
+          <a:stretch>
+            <a:fillRect/>
+          </a:stretch>
+        </p:blipFill>
+        <p:spPr>
+          <a:xfrm>
+            <a:off x="3923579" y="1845117"/>
+            <a:ext cx="2598699" cy="4421870"/>
+          </a:xfrm>
+          <a:prstGeom prst="rect">
+            <a:avLst/>
+          </a:prstGeom>
+        </p:spPr>
+      </p:pic>
+      <p:pic>
+        <p:nvPicPr>
+          <p:cNvPr id="12" name="Picture 11">
+            <a:extLst>
+              <a:ext uri="{FF2B5EF4-FFF2-40B4-BE49-F238E27FC236}">
+                <a16:creationId xmlns:a16="http://schemas.microsoft.com/office/drawing/2014/main" id="{CFACBE86-EB08-4E09-B118-20D1278AE1FA}"/>
+              </a:ext>
+            </a:extLst>
+          </p:cNvPr>
+          <p:cNvPicPr>
+            <a:picLocks noChangeAspect="1"/>
+          </p:cNvPicPr>
+          <p:nvPr/>
+        </p:nvPicPr>
+        <p:blipFill>
+          <a:blip r:embed="rId3"/>
+          <a:stretch>
+            <a:fillRect/>
+          </a:stretch>
+        </p:blipFill>
+        <p:spPr>
+          <a:xfrm>
+            <a:off x="294542" y="1845116"/>
+            <a:ext cx="2571488" cy="4421871"/>
+          </a:xfrm>
+          <a:prstGeom prst="rect">
+            <a:avLst/>
+          </a:prstGeom>
+        </p:spPr>
+      </p:pic>
+      <p:sp>
+        <p:nvSpPr>
+          <p:cNvPr id="13" name="Content Placeholder 2">
+            <a:extLst>
+              <a:ext uri="{FF2B5EF4-FFF2-40B4-BE49-F238E27FC236}">
+                <a16:creationId xmlns:a16="http://schemas.microsoft.com/office/drawing/2014/main" id="{509D8672-6234-4F65-B073-DF368E31EA7F}"/>
+              </a:ext>
+            </a:extLst>
+          </p:cNvPr>
+          <p:cNvSpPr txBox="1">
+            <a:spLocks/>
+          </p:cNvSpPr>
+          <p:nvPr/>
+        </p:nvSpPr>
+        <p:spPr>
+          <a:xfrm>
+            <a:off x="7430034" y="3175785"/>
+            <a:ext cx="3419064" cy="2147224"/>
+          </a:xfrm>
+          <a:prstGeom prst="rect">
+            <a:avLst/>
+          </a:prstGeom>
+        </p:spPr>
+        <p:txBody>
+          <a:bodyPr vert="horz" lIns="91440" tIns="45720" rIns="91440" bIns="45720" rtlCol="0">
+            <a:normAutofit/>
+          </a:bodyPr>
+          <a:lstStyle>
+            <a:lvl1pPr marL="228600" indent="-228600" algn="l" defTabSz="914400" rtl="0" eaLnBrk="1" latinLnBrk="0" hangingPunct="1">
+              <a:lnSpc>
+                <a:spcPct val="90000"/>
+              </a:lnSpc>
+              <a:spcBef>
+                <a:spcPts val="1000"/>
+              </a:spcBef>
+              <a:buFont typeface="Arial" panose="020B0604020202020204" pitchFamily="34" charset="0"/>
+              <a:buChar char="•"/>
+              <a:defRPr sz="2800" kern="1200">
+                <a:solidFill>
+                  <a:schemeClr val="tx1"/>
+                </a:solidFill>
+                <a:latin typeface="+mn-lt"/>
+                <a:ea typeface="+mn-ea"/>
+                <a:cs typeface="+mn-cs"/>
+              </a:defRPr>
+            </a:lvl1pPr>
+            <a:lvl2pPr marL="685800" indent="-228600" algn="l" defTabSz="914400" rtl="0" eaLnBrk="1" latinLnBrk="0" hangingPunct="1">
+              <a:lnSpc>
+                <a:spcPct val="90000"/>
+              </a:lnSpc>
+              <a:spcBef>
+                <a:spcPts val="500"/>
+              </a:spcBef>
+              <a:buFont typeface="Arial" panose="020B0604020202020204" pitchFamily="34" charset="0"/>
+              <a:buChar char="•"/>
+              <a:defRPr sz="2400" kern="1200">
+                <a:solidFill>
+                  <a:schemeClr val="tx1"/>
+                </a:solidFill>
+                <a:latin typeface="+mn-lt"/>
+                <a:ea typeface="+mn-ea"/>
+                <a:cs typeface="+mn-cs"/>
+              </a:defRPr>
+            </a:lvl2pPr>
+            <a:lvl3pPr marL="1143000" indent="-228600" algn="l" defTabSz="914400" rtl="0" eaLnBrk="1" latinLnBrk="0" hangingPunct="1">
+              <a:lnSpc>
+                <a:spcPct val="90000"/>
+              </a:lnSpc>
+              <a:spcBef>
+                <a:spcPts val="500"/>
+              </a:spcBef>
+              <a:buFont typeface="Arial" panose="020B0604020202020204" pitchFamily="34" charset="0"/>
+              <a:buChar char="•"/>
+              <a:defRPr sz="2000" kern="1200">
+                <a:solidFill>
+                  <a:schemeClr val="tx1"/>
+                </a:solidFill>
+                <a:latin typeface="+mn-lt"/>
+                <a:ea typeface="+mn-ea"/>
+                <a:cs typeface="+mn-cs"/>
+              </a:defRPr>
+            </a:lvl3pPr>
+            <a:lvl4pPr marL="1600200" indent="-228600" algn="l" defTabSz="914400" rtl="0" eaLnBrk="1" latinLnBrk="0" hangingPunct="1">
+              <a:lnSpc>
+                <a:spcPct val="90000"/>
+              </a:lnSpc>
+              <a:spcBef>
+                <a:spcPts val="500"/>
+              </a:spcBef>
+              <a:buFont typeface="Arial" panose="020B0604020202020204" pitchFamily="34" charset="0"/>
+              <a:buChar char="•"/>
+              <a:defRPr sz="1800" kern="1200">
+                <a:solidFill>
+                  <a:schemeClr val="tx1"/>
+                </a:solidFill>
+                <a:latin typeface="+mn-lt"/>
+                <a:ea typeface="+mn-ea"/>
+                <a:cs typeface="+mn-cs"/>
+              </a:defRPr>
+            </a:lvl4pPr>
+            <a:lvl5pPr marL="2057400" indent="-228600" algn="l" defTabSz="914400" rtl="0" eaLnBrk="1" latinLnBrk="0" hangingPunct="1">
+              <a:lnSpc>
+                <a:spcPct val="90000"/>
+              </a:lnSpc>
+              <a:spcBef>
+                <a:spcPts val="500"/>
+              </a:spcBef>
+              <a:buFont typeface="Arial" panose="020B0604020202020204" pitchFamily="34" charset="0"/>
+              <a:buChar char="•"/>
+              <a:defRPr sz="1800" kern="1200">
+                <a:solidFill>
+                  <a:schemeClr val="tx1"/>
+                </a:solidFill>
+                <a:latin typeface="+mn-lt"/>
+                <a:ea typeface="+mn-ea"/>
+                <a:cs typeface="+mn-cs"/>
+              </a:defRPr>
+            </a:lvl5pPr>
+            <a:lvl6pPr marL="2514600" indent="-228600" algn="l" defTabSz="914400" rtl="0" eaLnBrk="1" latinLnBrk="0" hangingPunct="1">
+              <a:lnSpc>
+                <a:spcPct val="90000"/>
+              </a:lnSpc>
+              <a:spcBef>
+                <a:spcPts val="500"/>
+              </a:spcBef>
+              <a:buFont typeface="Arial" panose="020B0604020202020204" pitchFamily="34" charset="0"/>
+              <a:buChar char="•"/>
+              <a:defRPr sz="1800" kern="1200">
+                <a:solidFill>
+                  <a:schemeClr val="tx1"/>
+                </a:solidFill>
+                <a:latin typeface="+mn-lt"/>
+                <a:ea typeface="+mn-ea"/>
+                <a:cs typeface="+mn-cs"/>
+              </a:defRPr>
+            </a:lvl6pPr>
+            <a:lvl7pPr marL="2971800" indent="-228600" algn="l" defTabSz="914400" rtl="0" eaLnBrk="1" latinLnBrk="0" hangingPunct="1">
+              <a:lnSpc>
+                <a:spcPct val="90000"/>
+              </a:lnSpc>
+              <a:spcBef>
+                <a:spcPts val="500"/>
+              </a:spcBef>
+              <a:buFont typeface="Arial" panose="020B0604020202020204" pitchFamily="34" charset="0"/>
+              <a:buChar char="•"/>
+              <a:defRPr sz="1800" kern="1200">
+                <a:solidFill>
+                  <a:schemeClr val="tx1"/>
+                </a:solidFill>
+                <a:latin typeface="+mn-lt"/>
+                <a:ea typeface="+mn-ea"/>
+                <a:cs typeface="+mn-cs"/>
+              </a:defRPr>
+            </a:lvl7pPr>
+            <a:lvl8pPr marL="3429000" indent="-228600" algn="l" defTabSz="914400" rtl="0" eaLnBrk="1" latinLnBrk="0" hangingPunct="1">
+              <a:lnSpc>
+                <a:spcPct val="90000"/>
+              </a:lnSpc>
+              <a:spcBef>
+                <a:spcPts val="500"/>
+              </a:spcBef>
+              <a:buFont typeface="Arial" panose="020B0604020202020204" pitchFamily="34" charset="0"/>
+              <a:buChar char="•"/>
+              <a:defRPr sz="1800" kern="1200">
+                <a:solidFill>
+                  <a:schemeClr val="tx1"/>
+                </a:solidFill>
+                <a:latin typeface="+mn-lt"/>
+                <a:ea typeface="+mn-ea"/>
+                <a:cs typeface="+mn-cs"/>
+              </a:defRPr>
+            </a:lvl8pPr>
+            <a:lvl9pPr marL="3886200" indent="-228600" algn="l" defTabSz="914400" rtl="0" eaLnBrk="1" latinLnBrk="0" hangingPunct="1">
+              <a:lnSpc>
+                <a:spcPct val="90000"/>
+              </a:lnSpc>
+              <a:spcBef>
+                <a:spcPts val="500"/>
+              </a:spcBef>
+              <a:buFont typeface="Arial" panose="020B0604020202020204" pitchFamily="34" charset="0"/>
+              <a:buChar char="•"/>
+              <a:defRPr sz="1800" kern="1200">
+                <a:solidFill>
+                  <a:schemeClr val="tx1"/>
+                </a:solidFill>
+                <a:latin typeface="+mn-lt"/>
+                <a:ea typeface="+mn-ea"/>
+                <a:cs typeface="+mn-cs"/>
+              </a:defRPr>
+            </a:lvl9pPr>
+          </a:lstStyle>
+          <a:p>
+            <a:r>
+              <a:rPr lang="en-GB" dirty="0"/>
+              <a:t>Timing mechanic</a:t>
+            </a:r>
+          </a:p>
+          <a:p>
+            <a:endParaRPr lang="en-GB" dirty="0"/>
+          </a:p>
+          <a:p>
+            <a:r>
+              <a:rPr lang="en-GB" dirty="0"/>
+              <a:t>First turn</a:t>
+            </a:r>
+          </a:p>
+          <a:p>
+            <a:endParaRPr lang="en-GB" dirty="0"/>
+          </a:p>
+        </p:txBody>
+      </p:sp>
     </p:spTree>
     <p:extLst>
       <p:ext uri="{BB962C8B-B14F-4D97-AF65-F5344CB8AC3E}">
@@ -3798,7 +4047,12 @@
             <p:ph idx="1"/>
           </p:nvPr>
         </p:nvSpPr>
-        <p:spPr/>
+        <p:spPr>
+          <a:xfrm>
+            <a:off x="838200" y="1825625"/>
+            <a:ext cx="10515600" cy="1818327"/>
+          </a:xfrm>
+        </p:spPr>
         <p:txBody>
           <a:bodyPr/>
           <a:lstStyle/>
@@ -3807,6 +4061,235 @@
               <a:rPr lang="en-GB" dirty="0"/>
               <a:t>*Brief synopsis of what each player does within the game and how they interact with each other; core game loop*</a:t>
             </a:r>
+          </a:p>
+        </p:txBody>
+      </p:sp>
+      <p:sp>
+        <p:nvSpPr>
+          <p:cNvPr id="4" name="Content Placeholder 2">
+            <a:extLst>
+              <a:ext uri="{FF2B5EF4-FFF2-40B4-BE49-F238E27FC236}">
+                <a16:creationId xmlns:a16="http://schemas.microsoft.com/office/drawing/2014/main" id="{1E9CB42E-A69C-40C0-B012-2E9152796405}"/>
+              </a:ext>
+            </a:extLst>
+          </p:cNvPr>
+          <p:cNvSpPr txBox="1">
+            <a:spLocks/>
+          </p:cNvSpPr>
+          <p:nvPr/>
+        </p:nvSpPr>
+        <p:spPr>
+          <a:xfrm>
+            <a:off x="838200" y="3643952"/>
+            <a:ext cx="10515600" cy="2692752"/>
+          </a:xfrm>
+          <a:prstGeom prst="rect">
+            <a:avLst/>
+          </a:prstGeom>
+        </p:spPr>
+        <p:txBody>
+          <a:bodyPr vert="horz" lIns="91440" tIns="45720" rIns="91440" bIns="45720" rtlCol="0">
+            <a:normAutofit/>
+          </a:bodyPr>
+          <a:lstStyle>
+            <a:lvl1pPr marL="228600" indent="-228600" algn="l" defTabSz="914400" rtl="0" eaLnBrk="1" latinLnBrk="0" hangingPunct="1">
+              <a:lnSpc>
+                <a:spcPct val="90000"/>
+              </a:lnSpc>
+              <a:spcBef>
+                <a:spcPts val="1000"/>
+              </a:spcBef>
+              <a:buFont typeface="Arial" panose="020B0604020202020204" pitchFamily="34" charset="0"/>
+              <a:buChar char="•"/>
+              <a:defRPr sz="2800" kern="1200">
+                <a:solidFill>
+                  <a:schemeClr val="tx1"/>
+                </a:solidFill>
+                <a:latin typeface="+mn-lt"/>
+                <a:ea typeface="+mn-ea"/>
+                <a:cs typeface="+mn-cs"/>
+              </a:defRPr>
+            </a:lvl1pPr>
+            <a:lvl2pPr marL="685800" indent="-228600" algn="l" defTabSz="914400" rtl="0" eaLnBrk="1" latinLnBrk="0" hangingPunct="1">
+              <a:lnSpc>
+                <a:spcPct val="90000"/>
+              </a:lnSpc>
+              <a:spcBef>
+                <a:spcPts val="500"/>
+              </a:spcBef>
+              <a:buFont typeface="Arial" panose="020B0604020202020204" pitchFamily="34" charset="0"/>
+              <a:buChar char="•"/>
+              <a:defRPr sz="2400" kern="1200">
+                <a:solidFill>
+                  <a:schemeClr val="tx1"/>
+                </a:solidFill>
+                <a:latin typeface="+mn-lt"/>
+                <a:ea typeface="+mn-ea"/>
+                <a:cs typeface="+mn-cs"/>
+              </a:defRPr>
+            </a:lvl2pPr>
+            <a:lvl3pPr marL="1143000" indent="-228600" algn="l" defTabSz="914400" rtl="0" eaLnBrk="1" latinLnBrk="0" hangingPunct="1">
+              <a:lnSpc>
+                <a:spcPct val="90000"/>
+              </a:lnSpc>
+              <a:spcBef>
+                <a:spcPts val="500"/>
+              </a:spcBef>
+              <a:buFont typeface="Arial" panose="020B0604020202020204" pitchFamily="34" charset="0"/>
+              <a:buChar char="•"/>
+              <a:defRPr sz="2000" kern="1200">
+                <a:solidFill>
+                  <a:schemeClr val="tx1"/>
+                </a:solidFill>
+                <a:latin typeface="+mn-lt"/>
+                <a:ea typeface="+mn-ea"/>
+                <a:cs typeface="+mn-cs"/>
+              </a:defRPr>
+            </a:lvl3pPr>
+            <a:lvl4pPr marL="1600200" indent="-228600" algn="l" defTabSz="914400" rtl="0" eaLnBrk="1" latinLnBrk="0" hangingPunct="1">
+              <a:lnSpc>
+                <a:spcPct val="90000"/>
+              </a:lnSpc>
+              <a:spcBef>
+                <a:spcPts val="500"/>
+              </a:spcBef>
+              <a:buFont typeface="Arial" panose="020B0604020202020204" pitchFamily="34" charset="0"/>
+              <a:buChar char="•"/>
+              <a:defRPr sz="1800" kern="1200">
+                <a:solidFill>
+                  <a:schemeClr val="tx1"/>
+                </a:solidFill>
+                <a:latin typeface="+mn-lt"/>
+                <a:ea typeface="+mn-ea"/>
+                <a:cs typeface="+mn-cs"/>
+              </a:defRPr>
+            </a:lvl4pPr>
+            <a:lvl5pPr marL="2057400" indent="-228600" algn="l" defTabSz="914400" rtl="0" eaLnBrk="1" latinLnBrk="0" hangingPunct="1">
+              <a:lnSpc>
+                <a:spcPct val="90000"/>
+              </a:lnSpc>
+              <a:spcBef>
+                <a:spcPts val="500"/>
+              </a:spcBef>
+              <a:buFont typeface="Arial" panose="020B0604020202020204" pitchFamily="34" charset="0"/>
+              <a:buChar char="•"/>
+              <a:defRPr sz="1800" kern="1200">
+                <a:solidFill>
+                  <a:schemeClr val="tx1"/>
+                </a:solidFill>
+                <a:latin typeface="+mn-lt"/>
+                <a:ea typeface="+mn-ea"/>
+                <a:cs typeface="+mn-cs"/>
+              </a:defRPr>
+            </a:lvl5pPr>
+            <a:lvl6pPr marL="2514600" indent="-228600" algn="l" defTabSz="914400" rtl="0" eaLnBrk="1" latinLnBrk="0" hangingPunct="1">
+              <a:lnSpc>
+                <a:spcPct val="90000"/>
+              </a:lnSpc>
+              <a:spcBef>
+                <a:spcPts val="500"/>
+              </a:spcBef>
+              <a:buFont typeface="Arial" panose="020B0604020202020204" pitchFamily="34" charset="0"/>
+              <a:buChar char="•"/>
+              <a:defRPr sz="1800" kern="1200">
+                <a:solidFill>
+                  <a:schemeClr val="tx1"/>
+                </a:solidFill>
+                <a:latin typeface="+mn-lt"/>
+                <a:ea typeface="+mn-ea"/>
+                <a:cs typeface="+mn-cs"/>
+              </a:defRPr>
+            </a:lvl6pPr>
+            <a:lvl7pPr marL="2971800" indent="-228600" algn="l" defTabSz="914400" rtl="0" eaLnBrk="1" latinLnBrk="0" hangingPunct="1">
+              <a:lnSpc>
+                <a:spcPct val="90000"/>
+              </a:lnSpc>
+              <a:spcBef>
+                <a:spcPts val="500"/>
+              </a:spcBef>
+              <a:buFont typeface="Arial" panose="020B0604020202020204" pitchFamily="34" charset="0"/>
+              <a:buChar char="•"/>
+              <a:defRPr sz="1800" kern="1200">
+                <a:solidFill>
+                  <a:schemeClr val="tx1"/>
+                </a:solidFill>
+                <a:latin typeface="+mn-lt"/>
+                <a:ea typeface="+mn-ea"/>
+                <a:cs typeface="+mn-cs"/>
+              </a:defRPr>
+            </a:lvl7pPr>
+            <a:lvl8pPr marL="3429000" indent="-228600" algn="l" defTabSz="914400" rtl="0" eaLnBrk="1" latinLnBrk="0" hangingPunct="1">
+              <a:lnSpc>
+                <a:spcPct val="90000"/>
+              </a:lnSpc>
+              <a:spcBef>
+                <a:spcPts val="500"/>
+              </a:spcBef>
+              <a:buFont typeface="Arial" panose="020B0604020202020204" pitchFamily="34" charset="0"/>
+              <a:buChar char="•"/>
+              <a:defRPr sz="1800" kern="1200">
+                <a:solidFill>
+                  <a:schemeClr val="tx1"/>
+                </a:solidFill>
+                <a:latin typeface="+mn-lt"/>
+                <a:ea typeface="+mn-ea"/>
+                <a:cs typeface="+mn-cs"/>
+              </a:defRPr>
+            </a:lvl8pPr>
+            <a:lvl9pPr marL="3886200" indent="-228600" algn="l" defTabSz="914400" rtl="0" eaLnBrk="1" latinLnBrk="0" hangingPunct="1">
+              <a:lnSpc>
+                <a:spcPct val="90000"/>
+              </a:lnSpc>
+              <a:spcBef>
+                <a:spcPts val="500"/>
+              </a:spcBef>
+              <a:buFont typeface="Arial" panose="020B0604020202020204" pitchFamily="34" charset="0"/>
+              <a:buChar char="•"/>
+              <a:defRPr sz="1800" kern="1200">
+                <a:solidFill>
+                  <a:schemeClr val="tx1"/>
+                </a:solidFill>
+                <a:latin typeface="+mn-lt"/>
+                <a:ea typeface="+mn-ea"/>
+                <a:cs typeface="+mn-cs"/>
+              </a:defRPr>
+            </a:lvl9pPr>
+          </a:lstStyle>
+          <a:p>
+            <a:r>
+              <a:rPr lang="en-GB" dirty="0"/>
+              <a:t>1</a:t>
+            </a:r>
+          </a:p>
+          <a:p>
+            <a:r>
+              <a:rPr lang="en-GB" dirty="0"/>
+              <a:t>2</a:t>
+            </a:r>
+          </a:p>
+          <a:p>
+            <a:r>
+              <a:rPr lang="en-GB" dirty="0"/>
+              <a:t>3</a:t>
+            </a:r>
+          </a:p>
+          <a:p>
+            <a:r>
+              <a:rPr lang="en-GB" dirty="0"/>
+              <a:t>4</a:t>
+            </a:r>
+          </a:p>
+          <a:p>
+            <a:r>
+              <a:rPr lang="en-GB" dirty="0"/>
+              <a:t>5</a:t>
+            </a:r>
+          </a:p>
+          <a:p>
+            <a:endParaRPr lang="en-GB" dirty="0"/>
+          </a:p>
+          <a:p>
+            <a:endParaRPr lang="en-GB" dirty="0"/>
           </a:p>
         </p:txBody>
       </p:sp>
@@ -3876,38 +4359,46 @@
           </a:p>
         </p:txBody>
       </p:sp>
-      <p:sp>
-        <p:nvSpPr>
-          <p:cNvPr id="3" name="Content Placeholder 2">
-            <a:extLst>
-              <a:ext uri="{FF2B5EF4-FFF2-40B4-BE49-F238E27FC236}">
-                <a16:creationId xmlns:a16="http://schemas.microsoft.com/office/drawing/2014/main" id="{A08B4422-F4F9-4C51-8C45-54A5E80C30A6}"/>
-              </a:ext>
-            </a:extLst>
-          </p:cNvPr>
-          <p:cNvSpPr>
-            <a:spLocks noGrp="1"/>
-          </p:cNvSpPr>
-          <p:nvPr>
-            <p:ph idx="1"/>
-          </p:nvPr>
-        </p:nvSpPr>
-        <p:spPr/>
-        <p:txBody>
-          <a:bodyPr/>
-          <a:lstStyle/>
-          <a:p>
-            <a:r>
-              <a:rPr lang="en-GB" dirty="0"/>
-              <a:t>*Video*</a:t>
-            </a:r>
-          </a:p>
-        </p:txBody>
-      </p:sp>
+      <p:pic>
+        <p:nvPicPr>
+          <p:cNvPr id="7" name="Picture 6">
+            <a:extLst>
+              <a:ext uri="{FF2B5EF4-FFF2-40B4-BE49-F238E27FC236}">
+                <a16:creationId xmlns:a16="http://schemas.microsoft.com/office/drawing/2014/main" id="{1427A5F8-DC47-421B-9C9B-65CA9ADD5789}"/>
+              </a:ext>
+            </a:extLst>
+          </p:cNvPr>
+          <p:cNvPicPr>
+            <a:picLocks noChangeAspect="1"/>
+          </p:cNvPicPr>
+          <p:nvPr/>
+        </p:nvPicPr>
+        <p:blipFill>
+          <a:blip r:embed="rId2">
+            <a:extLst>
+              <a:ext uri="{28A0092B-C50C-407E-A947-70E740481C1C}">
+                <a14:useLocalDpi xmlns:a14="http://schemas.microsoft.com/office/drawing/2010/main" val="0"/>
+              </a:ext>
+            </a:extLst>
+          </a:blip>
+          <a:stretch>
+            <a:fillRect/>
+          </a:stretch>
+        </p:blipFill>
+        <p:spPr>
+          <a:xfrm>
+            <a:off x="838200" y="1550010"/>
+            <a:ext cx="2844624" cy="4850832"/>
+          </a:xfrm>
+          <a:prstGeom prst="rect">
+            <a:avLst/>
+          </a:prstGeom>
+        </p:spPr>
+      </p:pic>
     </p:spTree>
     <p:extLst>
       <p:ext uri="{BB962C8B-B14F-4D97-AF65-F5344CB8AC3E}">
-        <p14:creationId xmlns:p14="http://schemas.microsoft.com/office/powerpoint/2010/main" val="1394471631"/>
+        <p14:creationId xmlns:p14="http://schemas.microsoft.com/office/powerpoint/2010/main" val="4088865366"/>
       </p:ext>
     </p:extLst>
   </p:cSld>
@@ -3947,7 +4438,7 @@
           <p:cNvPr id="2" name="Title 1">
             <a:extLst>
               <a:ext uri="{FF2B5EF4-FFF2-40B4-BE49-F238E27FC236}">
-                <a16:creationId xmlns:a16="http://schemas.microsoft.com/office/drawing/2014/main" id="{73828152-3DC4-4E97-8E49-DAEACD7E189F}"/>
+                <a16:creationId xmlns:a16="http://schemas.microsoft.com/office/drawing/2014/main" id="{1EC83B0E-3A8D-407C-BDDE-B76CDED8279A}"/>
               </a:ext>
             </a:extLst>
           </p:cNvPr>
@@ -3965,43 +4456,51 @@
           <a:p>
             <a:r>
               <a:rPr lang="en-GB" dirty="0"/>
-              <a:t>*Iterative Cycle*</a:t>
-            </a:r>
-          </a:p>
-        </p:txBody>
-      </p:sp>
-      <p:sp>
-        <p:nvSpPr>
-          <p:cNvPr id="3" name="Content Placeholder 2">
-            <a:extLst>
-              <a:ext uri="{FF2B5EF4-FFF2-40B4-BE49-F238E27FC236}">
-                <a16:creationId xmlns:a16="http://schemas.microsoft.com/office/drawing/2014/main" id="{2C16AB9E-1A28-4EBA-BB56-8EFFDF5C2916}"/>
-              </a:ext>
-            </a:extLst>
-          </p:cNvPr>
-          <p:cNvSpPr>
-            <a:spLocks noGrp="1"/>
-          </p:cNvSpPr>
-          <p:nvPr>
-            <p:ph idx="1"/>
-          </p:nvPr>
-        </p:nvSpPr>
-        <p:spPr/>
-        <p:txBody>
-          <a:bodyPr/>
-          <a:lstStyle/>
-          <a:p>
-            <a:r>
-              <a:rPr lang="en-GB" dirty="0"/>
-              <a:t>*Playtesting Feedback and how iterative cycle impacted latest build*</a:t>
-            </a:r>
-          </a:p>
-        </p:txBody>
-      </p:sp>
+              <a:t>*Footage of Latest Prototype*</a:t>
+            </a:r>
+          </a:p>
+        </p:txBody>
+      </p:sp>
+      <p:pic>
+        <p:nvPicPr>
+          <p:cNvPr id="9" name="Picture 8">
+            <a:extLst>
+              <a:ext uri="{FF2B5EF4-FFF2-40B4-BE49-F238E27FC236}">
+                <a16:creationId xmlns:a16="http://schemas.microsoft.com/office/drawing/2014/main" id="{8BCE70A1-535D-4FE0-BC59-A0BB1E251FFE}"/>
+              </a:ext>
+            </a:extLst>
+          </p:cNvPr>
+          <p:cNvPicPr>
+            <a:picLocks noChangeAspect="1"/>
+          </p:cNvPicPr>
+          <p:nvPr/>
+        </p:nvPicPr>
+        <p:blipFill>
+          <a:blip r:embed="rId2">
+            <a:extLst>
+              <a:ext uri="{28A0092B-C50C-407E-A947-70E740481C1C}">
+                <a14:useLocalDpi xmlns:a14="http://schemas.microsoft.com/office/drawing/2010/main" val="0"/>
+              </a:ext>
+            </a:extLst>
+          </a:blip>
+          <a:stretch>
+            <a:fillRect/>
+          </a:stretch>
+        </p:blipFill>
+        <p:spPr>
+          <a:xfrm>
+            <a:off x="838200" y="1566529"/>
+            <a:ext cx="2855488" cy="4848381"/>
+          </a:xfrm>
+          <a:prstGeom prst="rect">
+            <a:avLst/>
+          </a:prstGeom>
+        </p:spPr>
+      </p:pic>
     </p:spTree>
     <p:extLst>
       <p:ext uri="{BB962C8B-B14F-4D97-AF65-F5344CB8AC3E}">
-        <p14:creationId xmlns:p14="http://schemas.microsoft.com/office/powerpoint/2010/main" val="708454092"/>
+        <p14:creationId xmlns:p14="http://schemas.microsoft.com/office/powerpoint/2010/main" val="1394471631"/>
       </p:ext>
     </p:extLst>
   </p:cSld>
@@ -4041,6 +4540,191 @@
           <p:cNvPr id="2" name="Title 1">
             <a:extLst>
               <a:ext uri="{FF2B5EF4-FFF2-40B4-BE49-F238E27FC236}">
+                <a16:creationId xmlns:a16="http://schemas.microsoft.com/office/drawing/2014/main" id="{73828152-3DC4-4E97-8E49-DAEACD7E189F}"/>
+              </a:ext>
+            </a:extLst>
+          </p:cNvPr>
+          <p:cNvSpPr>
+            <a:spLocks noGrp="1"/>
+          </p:cNvSpPr>
+          <p:nvPr>
+            <p:ph type="title"/>
+          </p:nvPr>
+        </p:nvSpPr>
+        <p:spPr/>
+        <p:txBody>
+          <a:bodyPr/>
+          <a:lstStyle/>
+          <a:p>
+            <a:r>
+              <a:rPr lang="en-GB" dirty="0"/>
+              <a:t>*Iterative Cycle*</a:t>
+            </a:r>
+          </a:p>
+        </p:txBody>
+      </p:sp>
+      <p:sp>
+        <p:nvSpPr>
+          <p:cNvPr id="3" name="Content Placeholder 2">
+            <a:extLst>
+              <a:ext uri="{FF2B5EF4-FFF2-40B4-BE49-F238E27FC236}">
+                <a16:creationId xmlns:a16="http://schemas.microsoft.com/office/drawing/2014/main" id="{2C16AB9E-1A28-4EBA-BB56-8EFFDF5C2916}"/>
+              </a:ext>
+            </a:extLst>
+          </p:cNvPr>
+          <p:cNvSpPr>
+            <a:spLocks noGrp="1"/>
+          </p:cNvSpPr>
+          <p:nvPr>
+            <p:ph idx="1"/>
+          </p:nvPr>
+        </p:nvSpPr>
+        <p:spPr/>
+        <p:txBody>
+          <a:bodyPr/>
+          <a:lstStyle/>
+          <a:p>
+            <a:r>
+              <a:rPr lang="en-GB" dirty="0"/>
+              <a:t>*Playtesting Feedback and how iterative cycle impacted latest build*</a:t>
+            </a:r>
+          </a:p>
+        </p:txBody>
+      </p:sp>
+    </p:spTree>
+    <p:extLst>
+      <p:ext uri="{BB962C8B-B14F-4D97-AF65-F5344CB8AC3E}">
+        <p14:creationId xmlns:p14="http://schemas.microsoft.com/office/powerpoint/2010/main" val="708454092"/>
+      </p:ext>
+    </p:extLst>
+  </p:cSld>
+  <p:clrMapOvr>
+    <a:masterClrMapping/>
+  </p:clrMapOvr>
+</p:sld>
+</file>
+
+<file path=ppt/slides/slide7.xml><?xml version="1.0" encoding="utf-8"?>
+<p:sld xmlns:a="http://schemas.openxmlformats.org/drawingml/2006/main" xmlns:r="http://schemas.openxmlformats.org/officeDocument/2006/relationships" xmlns:p="http://schemas.openxmlformats.org/presentationml/2006/main">
+  <p:cSld>
+    <p:bg>
+      <p:bgPr>
+        <a:solidFill>
+          <a:srgbClr val="17BEBB"/>
+        </a:solidFill>
+        <a:effectLst/>
+      </p:bgPr>
+    </p:bg>
+    <p:spTree>
+      <p:nvGrpSpPr>
+        <p:cNvPr id="1" name=""/>
+        <p:cNvGrpSpPr/>
+        <p:nvPr/>
+      </p:nvGrpSpPr>
+      <p:grpSpPr>
+        <a:xfrm>
+          <a:off x="0" y="0"/>
+          <a:ext cx="0" cy="0"/>
+          <a:chOff x="0" y="0"/>
+          <a:chExt cx="0" cy="0"/>
+        </a:xfrm>
+      </p:grpSpPr>
+      <p:sp>
+        <p:nvSpPr>
+          <p:cNvPr id="3" name="Content Placeholder 2">
+            <a:extLst>
+              <a:ext uri="{FF2B5EF4-FFF2-40B4-BE49-F238E27FC236}">
+                <a16:creationId xmlns:a16="http://schemas.microsoft.com/office/drawing/2014/main" id="{3AA8EFFC-5908-4BEE-A28C-1C06E30504C8}"/>
+              </a:ext>
+            </a:extLst>
+          </p:cNvPr>
+          <p:cNvSpPr>
+            <a:spLocks noGrp="1"/>
+          </p:cNvSpPr>
+          <p:nvPr>
+            <p:ph idx="1"/>
+          </p:nvPr>
+        </p:nvSpPr>
+        <p:spPr/>
+        <p:txBody>
+          <a:bodyPr/>
+          <a:lstStyle/>
+          <a:p>
+            <a:endParaRPr lang="en-GB" dirty="0"/>
+          </a:p>
+        </p:txBody>
+      </p:sp>
+      <p:sp>
+        <p:nvSpPr>
+          <p:cNvPr id="5" name="Title 4">
+            <a:extLst>
+              <a:ext uri="{FF2B5EF4-FFF2-40B4-BE49-F238E27FC236}">
+                <a16:creationId xmlns:a16="http://schemas.microsoft.com/office/drawing/2014/main" id="{BA3CC881-BDB6-421A-92D4-4763DCCF1A10}"/>
+              </a:ext>
+            </a:extLst>
+          </p:cNvPr>
+          <p:cNvSpPr>
+            <a:spLocks noGrp="1"/>
+          </p:cNvSpPr>
+          <p:nvPr>
+            <p:ph type="title"/>
+          </p:nvPr>
+        </p:nvSpPr>
+        <p:spPr/>
+        <p:txBody>
+          <a:bodyPr/>
+          <a:lstStyle/>
+          <a:p>
+            <a:r>
+              <a:rPr lang="en-GB" dirty="0"/>
+              <a:t>art</a:t>
+            </a:r>
+          </a:p>
+        </p:txBody>
+      </p:sp>
+    </p:spTree>
+    <p:extLst>
+      <p:ext uri="{BB962C8B-B14F-4D97-AF65-F5344CB8AC3E}">
+        <p14:creationId xmlns:p14="http://schemas.microsoft.com/office/powerpoint/2010/main" val="109570831"/>
+      </p:ext>
+    </p:extLst>
+  </p:cSld>
+  <p:clrMapOvr>
+    <a:masterClrMapping/>
+  </p:clrMapOvr>
+</p:sld>
+</file>
+
+<file path=ppt/slides/slide8.xml><?xml version="1.0" encoding="utf-8"?>
+<p:sld xmlns:a="http://schemas.openxmlformats.org/drawingml/2006/main" xmlns:r="http://schemas.openxmlformats.org/officeDocument/2006/relationships" xmlns:p="http://schemas.openxmlformats.org/presentationml/2006/main">
+  <p:cSld>
+    <p:bg>
+      <p:bgPr>
+        <a:solidFill>
+          <a:srgbClr val="17BEBB"/>
+        </a:solidFill>
+        <a:effectLst/>
+      </p:bgPr>
+    </p:bg>
+    <p:spTree>
+      <p:nvGrpSpPr>
+        <p:cNvPr id="1" name=""/>
+        <p:cNvGrpSpPr/>
+        <p:nvPr/>
+      </p:nvGrpSpPr>
+      <p:grpSpPr>
+        <a:xfrm>
+          <a:off x="0" y="0"/>
+          <a:ext cx="0" cy="0"/>
+          <a:chOff x="0" y="0"/>
+          <a:chExt cx="0" cy="0"/>
+        </a:xfrm>
+      </p:grpSpPr>
+      <p:sp>
+        <p:nvSpPr>
+          <p:cNvPr id="2" name="Title 1">
+            <a:extLst>
+              <a:ext uri="{FF2B5EF4-FFF2-40B4-BE49-F238E27FC236}">
                 <a16:creationId xmlns:a16="http://schemas.microsoft.com/office/drawing/2014/main" id="{E428B2CF-3588-4B4A-B604-5B1590F65C55}"/>
               </a:ext>
             </a:extLst>
@@ -4080,7 +4764,12 @@
             <p:ph idx="1"/>
           </p:nvPr>
         </p:nvSpPr>
-        <p:spPr/>
+        <p:spPr>
+          <a:xfrm>
+            <a:off x="838200" y="1798330"/>
+            <a:ext cx="10515600" cy="4351338"/>
+          </a:xfrm>
+        </p:spPr>
         <p:txBody>
           <a:bodyPr/>
           <a:lstStyle/>
@@ -4105,7 +4794,7 @@
 </p:sld>
 </file>
 
-<file path=ppt/slides/slide7.xml><?xml version="1.0" encoding="utf-8"?>
+<file path=ppt/slides/slide9.xml><?xml version="1.0" encoding="utf-8"?>
 <p:sld xmlns:a="http://schemas.openxmlformats.org/drawingml/2006/main" xmlns:r="http://schemas.openxmlformats.org/officeDocument/2006/relationships" xmlns:p="http://schemas.openxmlformats.org/presentationml/2006/main">
   <p:cSld>
     <p:bg>

</xml_diff>

<commit_message>
Uploaded Revised Presentation PowerPoint
Also uploaded appropriate stock images (edited and otherwise) for potential later use.
</commit_message>
<xml_diff>
--- a/Pitch Presentations/Second Pitch Template.pptx
+++ b/Pitch Presentations/Second Pitch Template.pptx
@@ -10,10 +10,13 @@
     <p:sldId id="258" r:id="rId4"/>
     <p:sldId id="263" r:id="rId5"/>
     <p:sldId id="260" r:id="rId6"/>
-    <p:sldId id="259" r:id="rId7"/>
+    <p:sldId id="265" r:id="rId7"/>
     <p:sldId id="264" r:id="rId8"/>
-    <p:sldId id="261" r:id="rId9"/>
-    <p:sldId id="262" r:id="rId10"/>
+    <p:sldId id="259" r:id="rId9"/>
+    <p:sldId id="261" r:id="rId10"/>
+    <p:sldId id="262" r:id="rId11"/>
+    <p:sldId id="266" r:id="rId12"/>
+    <p:sldId id="267" r:id="rId13"/>
   </p:sldIdLst>
   <p:sldSz cx="12192000" cy="6858000"/>
   <p:notesSz cx="6858000" cy="9144000"/>
@@ -3390,7 +3393,7 @@
           <a:p>
             <a:r>
               <a:rPr lang="en-GB" dirty="0"/>
-              <a:t>*Placeholder Title*</a:t>
+              <a:t>Group 6</a:t>
             </a:r>
           </a:p>
         </p:txBody>
@@ -3413,17 +3416,13 @@
         </p:nvSpPr>
         <p:spPr/>
         <p:txBody>
-          <a:bodyPr/>
-          <a:lstStyle/>
-          <a:p>
-            <a:r>
-              <a:rPr lang="en-GB" dirty="0"/>
-              <a:t>Group 6</a:t>
-            </a:r>
-          </a:p>
-          <a:p>
-            <a:r>
-              <a:rPr lang="en-GB" dirty="0"/>
+          <a:bodyPr>
+            <a:normAutofit/>
+          </a:bodyPr>
+          <a:lstStyle/>
+          <a:p>
+            <a:r>
+              <a:rPr lang="en-GB" sz="3200" dirty="0"/>
               <a:t>Presentation 2</a:t>
             </a:r>
           </a:p>
@@ -3433,6 +3432,481 @@
     <p:extLst>
       <p:ext uri="{BB962C8B-B14F-4D97-AF65-F5344CB8AC3E}">
         <p14:creationId xmlns:p14="http://schemas.microsoft.com/office/powerpoint/2010/main" val="4241073678"/>
+      </p:ext>
+    </p:extLst>
+  </p:cSld>
+  <p:clrMapOvr>
+    <a:masterClrMapping/>
+  </p:clrMapOvr>
+</p:sld>
+</file>
+
+<file path=ppt/slides/slide10.xml><?xml version="1.0" encoding="utf-8"?>
+<p:sld xmlns:a="http://schemas.openxmlformats.org/drawingml/2006/main" xmlns:r="http://schemas.openxmlformats.org/officeDocument/2006/relationships" xmlns:p="http://schemas.openxmlformats.org/presentationml/2006/main">
+  <p:cSld>
+    <p:bg>
+      <p:bgPr>
+        <a:solidFill>
+          <a:srgbClr val="17BEBB"/>
+        </a:solidFill>
+        <a:effectLst/>
+      </p:bgPr>
+    </p:bg>
+    <p:spTree>
+      <p:nvGrpSpPr>
+        <p:cNvPr id="1" name=""/>
+        <p:cNvGrpSpPr/>
+        <p:nvPr/>
+      </p:nvGrpSpPr>
+      <p:grpSpPr>
+        <a:xfrm>
+          <a:off x="0" y="0"/>
+          <a:ext cx="0" cy="0"/>
+          <a:chOff x="0" y="0"/>
+          <a:chExt cx="0" cy="0"/>
+        </a:xfrm>
+      </p:grpSpPr>
+      <p:sp>
+        <p:nvSpPr>
+          <p:cNvPr id="2" name="Title 1">
+            <a:extLst>
+              <a:ext uri="{FF2B5EF4-FFF2-40B4-BE49-F238E27FC236}">
+                <a16:creationId xmlns:a16="http://schemas.microsoft.com/office/drawing/2014/main" id="{4F645F3E-C499-4E9F-BD70-42230E9C5192}"/>
+              </a:ext>
+            </a:extLst>
+          </p:cNvPr>
+          <p:cNvSpPr>
+            <a:spLocks noGrp="1"/>
+          </p:cNvSpPr>
+          <p:nvPr>
+            <p:ph type="title"/>
+          </p:nvPr>
+        </p:nvSpPr>
+        <p:spPr/>
+        <p:txBody>
+          <a:bodyPr/>
+          <a:lstStyle/>
+          <a:p>
+            <a:r>
+              <a:rPr lang="en-GB" dirty="0"/>
+              <a:t>Features of Game</a:t>
+            </a:r>
+          </a:p>
+        </p:txBody>
+      </p:sp>
+      <p:sp>
+        <p:nvSpPr>
+          <p:cNvPr id="3" name="Content Placeholder 2">
+            <a:extLst>
+              <a:ext uri="{FF2B5EF4-FFF2-40B4-BE49-F238E27FC236}">
+                <a16:creationId xmlns:a16="http://schemas.microsoft.com/office/drawing/2014/main" id="{DE963656-DFBE-4E78-80AB-0A3D6F191D64}"/>
+              </a:ext>
+            </a:extLst>
+          </p:cNvPr>
+          <p:cNvSpPr>
+            <a:spLocks noGrp="1"/>
+          </p:cNvSpPr>
+          <p:nvPr>
+            <p:ph idx="1"/>
+          </p:nvPr>
+        </p:nvSpPr>
+        <p:spPr/>
+        <p:txBody>
+          <a:bodyPr>
+            <a:normAutofit/>
+          </a:bodyPr>
+          <a:lstStyle/>
+          <a:p>
+            <a:r>
+              <a:rPr lang="en-GB" sz="3200" dirty="0"/>
+              <a:t>*Brief synopsis of all game’s current features and any currently planned for later builds (may link back to feedback/iterative cycle slide). As requested by Rob’s email*</a:t>
+            </a:r>
+          </a:p>
+        </p:txBody>
+      </p:sp>
+    </p:spTree>
+    <p:extLst>
+      <p:ext uri="{BB962C8B-B14F-4D97-AF65-F5344CB8AC3E}">
+        <p14:creationId xmlns:p14="http://schemas.microsoft.com/office/powerpoint/2010/main" val="1528507122"/>
+      </p:ext>
+    </p:extLst>
+  </p:cSld>
+  <p:clrMapOvr>
+    <a:masterClrMapping/>
+  </p:clrMapOvr>
+</p:sld>
+</file>
+
+<file path=ppt/slides/slide11.xml><?xml version="1.0" encoding="utf-8"?>
+<p:sld xmlns:a="http://schemas.openxmlformats.org/drawingml/2006/main" xmlns:r="http://schemas.openxmlformats.org/officeDocument/2006/relationships" xmlns:p="http://schemas.openxmlformats.org/presentationml/2006/main">
+  <p:cSld>
+    <p:bg>
+      <p:bgPr>
+        <a:solidFill>
+          <a:srgbClr val="17BEBB"/>
+        </a:solidFill>
+        <a:effectLst/>
+      </p:bgPr>
+    </p:bg>
+    <p:spTree>
+      <p:nvGrpSpPr>
+        <p:cNvPr id="1" name=""/>
+        <p:cNvGrpSpPr/>
+        <p:nvPr/>
+      </p:nvGrpSpPr>
+      <p:grpSpPr>
+        <a:xfrm>
+          <a:off x="0" y="0"/>
+          <a:ext cx="0" cy="0"/>
+          <a:chOff x="0" y="0"/>
+          <a:chExt cx="0" cy="0"/>
+        </a:xfrm>
+      </p:grpSpPr>
+      <p:sp>
+        <p:nvSpPr>
+          <p:cNvPr id="3" name="Content Placeholder 2">
+            <a:extLst>
+              <a:ext uri="{FF2B5EF4-FFF2-40B4-BE49-F238E27FC236}">
+                <a16:creationId xmlns:a16="http://schemas.microsoft.com/office/drawing/2014/main" id="{3F68D1A1-1B5D-413F-9C3E-EDDC7CBAF64B}"/>
+              </a:ext>
+            </a:extLst>
+          </p:cNvPr>
+          <p:cNvSpPr>
+            <a:spLocks noGrp="1"/>
+          </p:cNvSpPr>
+          <p:nvPr>
+            <p:ph idx="1"/>
+          </p:nvPr>
+        </p:nvSpPr>
+        <p:spPr>
+          <a:xfrm>
+            <a:off x="838200" y="2467991"/>
+            <a:ext cx="10515600" cy="4074851"/>
+          </a:xfrm>
+        </p:spPr>
+        <p:txBody>
+          <a:bodyPr>
+            <a:normAutofit/>
+          </a:bodyPr>
+          <a:lstStyle/>
+          <a:p>
+            <a:pPr marL="0" indent="0" algn="ctr">
+              <a:buNone/>
+            </a:pPr>
+            <a:r>
+              <a:rPr lang="en-GB" sz="11500" dirty="0"/>
+              <a:t>Questions?</a:t>
+            </a:r>
+          </a:p>
+        </p:txBody>
+      </p:sp>
+    </p:spTree>
+    <p:extLst>
+      <p:ext uri="{BB962C8B-B14F-4D97-AF65-F5344CB8AC3E}">
+        <p14:creationId xmlns:p14="http://schemas.microsoft.com/office/powerpoint/2010/main" val="1660080977"/>
+      </p:ext>
+    </p:extLst>
+  </p:cSld>
+  <p:clrMapOvr>
+    <a:masterClrMapping/>
+  </p:clrMapOvr>
+</p:sld>
+</file>
+
+<file path=ppt/slides/slide12.xml><?xml version="1.0" encoding="utf-8"?>
+<p:sld xmlns:a="http://schemas.openxmlformats.org/drawingml/2006/main" xmlns:r="http://schemas.openxmlformats.org/officeDocument/2006/relationships" xmlns:p="http://schemas.openxmlformats.org/presentationml/2006/main">
+  <p:cSld>
+    <p:spTree>
+      <p:nvGrpSpPr>
+        <p:cNvPr id="1" name=""/>
+        <p:cNvGrpSpPr/>
+        <p:nvPr/>
+      </p:nvGrpSpPr>
+      <p:grpSpPr>
+        <a:xfrm>
+          <a:off x="0" y="0"/>
+          <a:ext cx="0" cy="0"/>
+          <a:chOff x="0" y="0"/>
+          <a:chExt cx="0" cy="0"/>
+        </a:xfrm>
+      </p:grpSpPr>
+      <p:sp>
+        <p:nvSpPr>
+          <p:cNvPr id="2" name="Title 1">
+            <a:extLst>
+              <a:ext uri="{FF2B5EF4-FFF2-40B4-BE49-F238E27FC236}">
+                <a16:creationId xmlns:a16="http://schemas.microsoft.com/office/drawing/2014/main" id="{57BF9BED-1070-4115-A304-CDA6BE3A266D}"/>
+              </a:ext>
+            </a:extLst>
+          </p:cNvPr>
+          <p:cNvSpPr>
+            <a:spLocks noGrp="1"/>
+          </p:cNvSpPr>
+          <p:nvPr>
+            <p:ph type="title"/>
+          </p:nvPr>
+        </p:nvSpPr>
+        <p:spPr/>
+        <p:txBody>
+          <a:bodyPr/>
+          <a:lstStyle/>
+          <a:p>
+            <a:r>
+              <a:rPr lang="en-GB" dirty="0"/>
+              <a:t>*TEMPORARY SLIDE* - Only Purpose to Imbed custom colour scheme for later edits</a:t>
+            </a:r>
+          </a:p>
+        </p:txBody>
+      </p:sp>
+      <p:sp>
+        <p:nvSpPr>
+          <p:cNvPr id="4" name="Rectangle 3">
+            <a:extLst>
+              <a:ext uri="{FF2B5EF4-FFF2-40B4-BE49-F238E27FC236}">
+                <a16:creationId xmlns:a16="http://schemas.microsoft.com/office/drawing/2014/main" id="{686A461B-46E5-4F5E-9186-0C1CC9AA8F62}"/>
+              </a:ext>
+            </a:extLst>
+          </p:cNvPr>
+          <p:cNvSpPr/>
+          <p:nvPr/>
+        </p:nvSpPr>
+        <p:spPr>
+          <a:xfrm>
+            <a:off x="970625" y="2601157"/>
+            <a:ext cx="1722268" cy="1722268"/>
+          </a:xfrm>
+          <a:prstGeom prst="rect">
+            <a:avLst/>
+          </a:prstGeom>
+          <a:solidFill>
+            <a:srgbClr val="EF3E36"/>
+          </a:solidFill>
+        </p:spPr>
+        <p:style>
+          <a:lnRef idx="2">
+            <a:schemeClr val="accent1">
+              <a:shade val="50000"/>
+            </a:schemeClr>
+          </a:lnRef>
+          <a:fillRef idx="1">
+            <a:schemeClr val="accent1"/>
+          </a:fillRef>
+          <a:effectRef idx="0">
+            <a:schemeClr val="accent1"/>
+          </a:effectRef>
+          <a:fontRef idx="minor">
+            <a:schemeClr val="lt1"/>
+          </a:fontRef>
+        </p:style>
+        <p:txBody>
+          <a:bodyPr rtlCol="0" anchor="ctr"/>
+          <a:lstStyle/>
+          <a:p>
+            <a:pPr algn="ctr"/>
+            <a:endParaRPr lang="en-GB"/>
+          </a:p>
+        </p:txBody>
+      </p:sp>
+      <p:sp>
+        <p:nvSpPr>
+          <p:cNvPr id="5" name="Rectangle 4">
+            <a:extLst>
+              <a:ext uri="{FF2B5EF4-FFF2-40B4-BE49-F238E27FC236}">
+                <a16:creationId xmlns:a16="http://schemas.microsoft.com/office/drawing/2014/main" id="{FC66270B-8FC2-4FAF-9868-0639960E4E34}"/>
+              </a:ext>
+            </a:extLst>
+          </p:cNvPr>
+          <p:cNvSpPr/>
+          <p:nvPr/>
+        </p:nvSpPr>
+        <p:spPr>
+          <a:xfrm>
+            <a:off x="3117542" y="2601157"/>
+            <a:ext cx="1722268" cy="1722268"/>
+          </a:xfrm>
+          <a:prstGeom prst="rect">
+            <a:avLst/>
+          </a:prstGeom>
+          <a:solidFill>
+            <a:srgbClr val="17BEBB"/>
+          </a:solidFill>
+        </p:spPr>
+        <p:style>
+          <a:lnRef idx="2">
+            <a:schemeClr val="accent1">
+              <a:shade val="50000"/>
+            </a:schemeClr>
+          </a:lnRef>
+          <a:fillRef idx="1">
+            <a:schemeClr val="accent1"/>
+          </a:fillRef>
+          <a:effectRef idx="0">
+            <a:schemeClr val="accent1"/>
+          </a:effectRef>
+          <a:fontRef idx="minor">
+            <a:schemeClr val="lt1"/>
+          </a:fontRef>
+        </p:style>
+        <p:txBody>
+          <a:bodyPr rtlCol="0" anchor="ctr"/>
+          <a:lstStyle/>
+          <a:p>
+            <a:pPr algn="ctr"/>
+            <a:endParaRPr lang="en-GB"/>
+          </a:p>
+        </p:txBody>
+      </p:sp>
+      <p:sp>
+        <p:nvSpPr>
+          <p:cNvPr id="6" name="Rectangle 5">
+            <a:extLst>
+              <a:ext uri="{FF2B5EF4-FFF2-40B4-BE49-F238E27FC236}">
+                <a16:creationId xmlns:a16="http://schemas.microsoft.com/office/drawing/2014/main" id="{DF58E85A-CBD1-451B-83FB-32D6A0EB8AB4}"/>
+              </a:ext>
+            </a:extLst>
+          </p:cNvPr>
+          <p:cNvSpPr/>
+          <p:nvPr/>
+        </p:nvSpPr>
+        <p:spPr>
+          <a:xfrm>
+            <a:off x="5264459" y="2601157"/>
+            <a:ext cx="1722268" cy="1722268"/>
+          </a:xfrm>
+          <a:prstGeom prst="rect">
+            <a:avLst/>
+          </a:prstGeom>
+          <a:solidFill>
+            <a:srgbClr val="2E282A"/>
+          </a:solidFill>
+        </p:spPr>
+        <p:style>
+          <a:lnRef idx="2">
+            <a:schemeClr val="accent1">
+              <a:shade val="50000"/>
+            </a:schemeClr>
+          </a:lnRef>
+          <a:fillRef idx="1">
+            <a:schemeClr val="accent1"/>
+          </a:fillRef>
+          <a:effectRef idx="0">
+            <a:schemeClr val="accent1"/>
+          </a:effectRef>
+          <a:fontRef idx="minor">
+            <a:schemeClr val="lt1"/>
+          </a:fontRef>
+        </p:style>
+        <p:txBody>
+          <a:bodyPr rtlCol="0" anchor="ctr"/>
+          <a:lstStyle/>
+          <a:p>
+            <a:pPr algn="ctr"/>
+            <a:endParaRPr lang="en-GB"/>
+          </a:p>
+        </p:txBody>
+      </p:sp>
+      <p:sp>
+        <p:nvSpPr>
+          <p:cNvPr id="7" name="Rectangle 6">
+            <a:extLst>
+              <a:ext uri="{FF2B5EF4-FFF2-40B4-BE49-F238E27FC236}">
+                <a16:creationId xmlns:a16="http://schemas.microsoft.com/office/drawing/2014/main" id="{A58500A2-92CF-4291-A2D8-6859F740C143}"/>
+              </a:ext>
+            </a:extLst>
+          </p:cNvPr>
+          <p:cNvSpPr/>
+          <p:nvPr/>
+        </p:nvSpPr>
+        <p:spPr>
+          <a:xfrm>
+            <a:off x="7411376" y="2601157"/>
+            <a:ext cx="1722268" cy="1722268"/>
+          </a:xfrm>
+          <a:prstGeom prst="rect">
+            <a:avLst/>
+          </a:prstGeom>
+          <a:solidFill>
+            <a:srgbClr val="EDB88B"/>
+          </a:solidFill>
+        </p:spPr>
+        <p:style>
+          <a:lnRef idx="2">
+            <a:schemeClr val="accent1">
+              <a:shade val="50000"/>
+            </a:schemeClr>
+          </a:lnRef>
+          <a:fillRef idx="1">
+            <a:schemeClr val="accent1"/>
+          </a:fillRef>
+          <a:effectRef idx="0">
+            <a:schemeClr val="accent1"/>
+          </a:effectRef>
+          <a:fontRef idx="minor">
+            <a:schemeClr val="lt1"/>
+          </a:fontRef>
+        </p:style>
+        <p:txBody>
+          <a:bodyPr rtlCol="0" anchor="ctr"/>
+          <a:lstStyle/>
+          <a:p>
+            <a:pPr algn="ctr"/>
+            <a:endParaRPr lang="en-GB"/>
+          </a:p>
+        </p:txBody>
+      </p:sp>
+      <p:sp>
+        <p:nvSpPr>
+          <p:cNvPr id="8" name="Rectangle 7">
+            <a:extLst>
+              <a:ext uri="{FF2B5EF4-FFF2-40B4-BE49-F238E27FC236}">
+                <a16:creationId xmlns:a16="http://schemas.microsoft.com/office/drawing/2014/main" id="{C8A14B46-C39E-4E19-89C8-165738691FAB}"/>
+              </a:ext>
+            </a:extLst>
+          </p:cNvPr>
+          <p:cNvSpPr/>
+          <p:nvPr/>
+        </p:nvSpPr>
+        <p:spPr>
+          <a:xfrm>
+            <a:off x="9558293" y="2601157"/>
+            <a:ext cx="1722268" cy="1722268"/>
+          </a:xfrm>
+          <a:prstGeom prst="rect">
+            <a:avLst/>
+          </a:prstGeom>
+          <a:solidFill>
+            <a:srgbClr val="FAD8D6"/>
+          </a:solidFill>
+        </p:spPr>
+        <p:style>
+          <a:lnRef idx="2">
+            <a:schemeClr val="accent1">
+              <a:shade val="50000"/>
+            </a:schemeClr>
+          </a:lnRef>
+          <a:fillRef idx="1">
+            <a:schemeClr val="accent1"/>
+          </a:fillRef>
+          <a:effectRef idx="0">
+            <a:schemeClr val="accent1"/>
+          </a:effectRef>
+          <a:fontRef idx="minor">
+            <a:schemeClr val="lt1"/>
+          </a:fontRef>
+        </p:style>
+        <p:txBody>
+          <a:bodyPr rtlCol="0" anchor="ctr"/>
+          <a:lstStyle/>
+          <a:p>
+            <a:pPr algn="ctr"/>
+            <a:endParaRPr lang="en-GB"/>
+          </a:p>
+        </p:txBody>
+      </p:sp>
+    </p:spTree>
+    <p:extLst>
+      <p:ext uri="{BB962C8B-B14F-4D97-AF65-F5344CB8AC3E}">
+        <p14:creationId xmlns:p14="http://schemas.microsoft.com/office/powerpoint/2010/main" val="3651369605"/>
       </p:ext>
     </p:extLst>
   </p:cSld>
@@ -3490,7 +3964,7 @@
           <a:p>
             <a:r>
               <a:rPr lang="en-GB" dirty="0"/>
-              <a:t>*Refresher on our game*</a:t>
+              <a:t>What is our Game?</a:t>
             </a:r>
           </a:p>
         </p:txBody>
@@ -3511,8 +3985,8 @@
         </p:nvSpPr>
         <p:spPr>
           <a:xfrm>
-            <a:off x="7430034" y="771504"/>
-            <a:ext cx="3419064" cy="2147224"/>
+            <a:off x="7430034" y="1690688"/>
+            <a:ext cx="3419064" cy="1296993"/>
           </a:xfrm>
           <a:prstGeom prst="rect">
             <a:avLst/>
@@ -3520,7 +3994,7 @@
         </p:spPr>
         <p:txBody>
           <a:bodyPr vert="horz" lIns="91440" tIns="45720" rIns="91440" bIns="45720" rtlCol="0">
-            <a:normAutofit/>
+            <a:normAutofit lnSpcReduction="10000"/>
           </a:bodyPr>
           <a:lstStyle>
             <a:lvl1pPr marL="228600" indent="-228600" algn="l" defTabSz="914400" rtl="0" eaLnBrk="1" latinLnBrk="0" hangingPunct="1">
@@ -3688,7 +4162,7 @@
           </a:lstStyle>
           <a:p>
             <a:r>
-              <a:rPr lang="en-GB" dirty="0"/>
+              <a:rPr lang="en-GB" sz="3200" dirty="0"/>
               <a:t>Brief synopsis of game genre, theme etc… </a:t>
             </a:r>
           </a:p>
@@ -3771,7 +4245,7 @@
         <p:spPr>
           <a:xfrm>
             <a:off x="7430034" y="3175785"/>
-            <a:ext cx="3419064" cy="2147224"/>
+            <a:ext cx="3419064" cy="3091202"/>
           </a:xfrm>
           <a:prstGeom prst="rect">
             <a:avLst/>
@@ -3779,7 +4253,7 @@
         </p:spPr>
         <p:txBody>
           <a:bodyPr vert="horz" lIns="91440" tIns="45720" rIns="91440" bIns="45720" rtlCol="0">
-            <a:normAutofit/>
+            <a:normAutofit lnSpcReduction="10000"/>
           </a:bodyPr>
           <a:lstStyle>
             <a:lvl1pPr marL="228600" indent="-228600" algn="l" defTabSz="914400" rtl="0" eaLnBrk="1" latinLnBrk="0" hangingPunct="1">
@@ -3947,21 +4421,27 @@
           </a:lstStyle>
           <a:p>
             <a:r>
-              <a:rPr lang="en-GB" dirty="0"/>
+              <a:rPr lang="en-GB" sz="3200" dirty="0"/>
               <a:t>Timing mechanic</a:t>
             </a:r>
           </a:p>
           <a:p>
-            <a:endParaRPr lang="en-GB" dirty="0"/>
-          </a:p>
-          <a:p>
-            <a:r>
-              <a:rPr lang="en-GB" dirty="0"/>
+            <a:endParaRPr lang="en-GB" sz="3200" dirty="0"/>
+          </a:p>
+          <a:p>
+            <a:r>
+              <a:rPr lang="en-GB" sz="3200" dirty="0"/>
               <a:t>First turn</a:t>
             </a:r>
           </a:p>
           <a:p>
-            <a:endParaRPr lang="en-GB" dirty="0"/>
+            <a:endParaRPr lang="en-GB" sz="3200" dirty="0"/>
+          </a:p>
+          <a:p>
+            <a:r>
+              <a:rPr lang="en-GB" sz="3200" dirty="0"/>
+              <a:t>Time, Tap, Progress</a:t>
+            </a:r>
           </a:p>
         </p:txBody>
       </p:sp>
@@ -4026,7 +4506,7 @@
           <a:p>
             <a:r>
               <a:rPr lang="en-GB" dirty="0"/>
-              <a:t>*What does the player do?*</a:t>
+              <a:t>What does the player do?</a:t>
             </a:r>
           </a:p>
         </p:txBody>
@@ -4054,12 +4534,14 @@
           </a:xfrm>
         </p:spPr>
         <p:txBody>
-          <a:bodyPr/>
-          <a:lstStyle/>
-          <a:p>
-            <a:r>
-              <a:rPr lang="en-GB" dirty="0"/>
-              <a:t>*Brief synopsis of what each player does within the game and how they interact with each other; core game loop*</a:t>
+          <a:bodyPr>
+            <a:normAutofit/>
+          </a:bodyPr>
+          <a:lstStyle/>
+          <a:p>
+            <a:r>
+              <a:rPr lang="en-GB" sz="3200" dirty="0"/>
+              <a:t>*Brief synopsis of what each player does within the game and how they interact with each other; core game loop (this can be inserted from previous presentation)*</a:t>
             </a:r>
           </a:p>
         </p:txBody>
@@ -4089,7 +4571,7 @@
         </p:spPr>
         <p:txBody>
           <a:bodyPr vert="horz" lIns="91440" tIns="45720" rIns="91440" bIns="45720" rtlCol="0">
-            <a:normAutofit/>
+            <a:normAutofit lnSpcReduction="10000"/>
           </a:bodyPr>
           <a:lstStyle>
             <a:lvl1pPr marL="228600" indent="-228600" algn="l" defTabSz="914400" rtl="0" eaLnBrk="1" latinLnBrk="0" hangingPunct="1">
@@ -4257,31 +4739,31 @@
           </a:lstStyle>
           <a:p>
             <a:r>
-              <a:rPr lang="en-GB" dirty="0"/>
+              <a:rPr lang="en-GB" sz="3200" dirty="0"/>
               <a:t>1</a:t>
             </a:r>
           </a:p>
           <a:p>
             <a:r>
-              <a:rPr lang="en-GB" dirty="0"/>
+              <a:rPr lang="en-GB" sz="3200" dirty="0"/>
               <a:t>2</a:t>
             </a:r>
           </a:p>
           <a:p>
             <a:r>
-              <a:rPr lang="en-GB" dirty="0"/>
+              <a:rPr lang="en-GB" sz="3200" dirty="0"/>
               <a:t>3</a:t>
             </a:r>
           </a:p>
           <a:p>
             <a:r>
-              <a:rPr lang="en-GB" dirty="0"/>
+              <a:rPr lang="en-GB" sz="3200" dirty="0"/>
               <a:t>4</a:t>
             </a:r>
           </a:p>
           <a:p>
             <a:r>
-              <a:rPr lang="en-GB" dirty="0"/>
+              <a:rPr lang="en-GB" sz="3200" dirty="0"/>
               <a:t>5</a:t>
             </a:r>
           </a:p>
@@ -4354,7 +4836,7 @@
           <a:p>
             <a:r>
               <a:rPr lang="en-GB" dirty="0"/>
-              <a:t>*Footage of Latest Prototype*</a:t>
+              <a:t>Latest Prototype</a:t>
             </a:r>
           </a:p>
         </p:txBody>
@@ -4456,7 +4938,7 @@
           <a:p>
             <a:r>
               <a:rPr lang="en-GB" dirty="0"/>
-              <a:t>*Footage of Latest Prototype*</a:t>
+              <a:t>Latest Prototype</a:t>
             </a:r>
           </a:p>
         </p:txBody>
@@ -4540,7 +5022,7 @@
           <p:cNvPr id="2" name="Title 1">
             <a:extLst>
               <a:ext uri="{FF2B5EF4-FFF2-40B4-BE49-F238E27FC236}">
-                <a16:creationId xmlns:a16="http://schemas.microsoft.com/office/drawing/2014/main" id="{73828152-3DC4-4E97-8E49-DAEACD7E189F}"/>
+                <a16:creationId xmlns:a16="http://schemas.microsoft.com/office/drawing/2014/main" id="{E64E6B7E-815B-4AAF-AA60-E823F2FC1824}"/>
               </a:ext>
             </a:extLst>
           </p:cNvPr>
@@ -4558,7 +5040,7 @@
           <a:p>
             <a:r>
               <a:rPr lang="en-GB" dirty="0"/>
-              <a:t>*Iterative Cycle*</a:t>
+              <a:t>Theme</a:t>
             </a:r>
           </a:p>
         </p:txBody>
@@ -4568,7 +5050,7 @@
           <p:cNvPr id="3" name="Content Placeholder 2">
             <a:extLst>
               <a:ext uri="{FF2B5EF4-FFF2-40B4-BE49-F238E27FC236}">
-                <a16:creationId xmlns:a16="http://schemas.microsoft.com/office/drawing/2014/main" id="{2C16AB9E-1A28-4EBA-BB56-8EFFDF5C2916}"/>
+                <a16:creationId xmlns:a16="http://schemas.microsoft.com/office/drawing/2014/main" id="{E89CFDA0-92DB-41B5-B071-D8F2E7BC8CFA}"/>
               </a:ext>
             </a:extLst>
           </p:cNvPr>
@@ -4581,12 +5063,22 @@
         </p:nvSpPr>
         <p:spPr/>
         <p:txBody>
-          <a:bodyPr/>
-          <a:lstStyle/>
-          <a:p>
-            <a:r>
-              <a:rPr lang="en-GB" dirty="0"/>
-              <a:t>*Playtesting Feedback and how iterative cycle impacted latest build*</a:t>
+          <a:bodyPr>
+            <a:normAutofit/>
+          </a:bodyPr>
+          <a:lstStyle/>
+          <a:p>
+            <a:r>
+              <a:rPr lang="en-GB" sz="3200" dirty="0"/>
+              <a:t>*Explain what our theme is and backup thematic decisions. Refer to work carried out in “Justification for Game Theme” document found in Research\Game Development Research\ </a:t>
+            </a:r>
+            <a:r>
+              <a:rPr lang="en-GB" sz="3200" dirty="0" err="1"/>
+              <a:t>Thematics</a:t>
+            </a:r>
+            <a:r>
+              <a:rPr lang="en-GB" sz="3200" dirty="0"/>
+              <a:t>*</a:t>
             </a:r>
           </a:p>
         </p:txBody>
@@ -4594,7 +5086,7 @@
     </p:spTree>
     <p:extLst>
       <p:ext uri="{BB962C8B-B14F-4D97-AF65-F5344CB8AC3E}">
-        <p14:creationId xmlns:p14="http://schemas.microsoft.com/office/powerpoint/2010/main" val="708454092"/>
+        <p14:creationId xmlns:p14="http://schemas.microsoft.com/office/powerpoint/2010/main" val="383190869"/>
       </p:ext>
     </p:extLst>
   </p:cSld>
@@ -4647,10 +5139,15 @@
         </p:nvSpPr>
         <p:spPr/>
         <p:txBody>
-          <a:bodyPr/>
-          <a:lstStyle/>
-          <a:p>
-            <a:endParaRPr lang="en-GB" dirty="0"/>
+          <a:bodyPr>
+            <a:normAutofit/>
+          </a:bodyPr>
+          <a:lstStyle/>
+          <a:p>
+            <a:r>
+              <a:rPr lang="en-GB" sz="3200" dirty="0"/>
+              <a:t>*Insert various samples of concept art for both the player character (i.e. the ducks themselves), as well as various arms*</a:t>
+            </a:r>
           </a:p>
         </p:txBody>
       </p:sp>
@@ -4677,7 +5174,7 @@
           <a:p>
             <a:r>
               <a:rPr lang="en-GB" dirty="0"/>
-              <a:t>art</a:t>
+              <a:t>Concept Art</a:t>
             </a:r>
           </a:p>
         </p:txBody>
@@ -4725,7 +5222,7 @@
           <p:cNvPr id="2" name="Title 1">
             <a:extLst>
               <a:ext uri="{FF2B5EF4-FFF2-40B4-BE49-F238E27FC236}">
-                <a16:creationId xmlns:a16="http://schemas.microsoft.com/office/drawing/2014/main" id="{E428B2CF-3588-4B4A-B604-5B1590F65C55}"/>
+                <a16:creationId xmlns:a16="http://schemas.microsoft.com/office/drawing/2014/main" id="{73828152-3DC4-4E97-8E49-DAEACD7E189F}"/>
               </a:ext>
             </a:extLst>
           </p:cNvPr>
@@ -4743,7 +5240,7 @@
           <a:p>
             <a:r>
               <a:rPr lang="en-GB" dirty="0"/>
-              <a:t>*Where’s the fun?*</a:t>
+              <a:t>The Importance of Playtesting</a:t>
             </a:r>
           </a:p>
         </p:txBody>
@@ -4753,7 +5250,7 @@
           <p:cNvPr id="3" name="Content Placeholder 2">
             <a:extLst>
               <a:ext uri="{FF2B5EF4-FFF2-40B4-BE49-F238E27FC236}">
-                <a16:creationId xmlns:a16="http://schemas.microsoft.com/office/drawing/2014/main" id="{02CF3119-6179-40C4-A1C6-096CBD47D60E}"/>
+                <a16:creationId xmlns:a16="http://schemas.microsoft.com/office/drawing/2014/main" id="{2C16AB9E-1A28-4EBA-BB56-8EFFDF5C2916}"/>
               </a:ext>
             </a:extLst>
           </p:cNvPr>
@@ -4764,19 +5261,16 @@
             <p:ph idx="1"/>
           </p:nvPr>
         </p:nvSpPr>
-        <p:spPr>
-          <a:xfrm>
-            <a:off x="838200" y="1798330"/>
-            <a:ext cx="10515600" cy="4351338"/>
-          </a:xfrm>
-        </p:spPr>
-        <p:txBody>
-          <a:bodyPr/>
-          <a:lstStyle/>
-          <a:p>
-            <a:r>
-              <a:rPr lang="en-GB" dirty="0"/>
-              <a:t>*Describe how game mechanics/theme relate to appropriate theory on fun; 4 keys 2 fun etc…*</a:t>
+        <p:spPr/>
+        <p:txBody>
+          <a:bodyPr>
+            <a:normAutofit/>
+          </a:bodyPr>
+          <a:lstStyle/>
+          <a:p>
+            <a:r>
+              <a:rPr lang="en-GB" sz="3200" dirty="0"/>
+              <a:t>*Playtesting Feedback and how iterative cycle impacted latest build (could also make connections to demographics?)*</a:t>
             </a:r>
           </a:p>
         </p:txBody>
@@ -4784,7 +5278,7 @@
     </p:spTree>
     <p:extLst>
       <p:ext uri="{BB962C8B-B14F-4D97-AF65-F5344CB8AC3E}">
-        <p14:creationId xmlns:p14="http://schemas.microsoft.com/office/powerpoint/2010/main" val="345960583"/>
+        <p14:creationId xmlns:p14="http://schemas.microsoft.com/office/powerpoint/2010/main" val="708454092"/>
       </p:ext>
     </p:extLst>
   </p:cSld>
@@ -4824,7 +5318,7 @@
           <p:cNvPr id="2" name="Title 1">
             <a:extLst>
               <a:ext uri="{FF2B5EF4-FFF2-40B4-BE49-F238E27FC236}">
-                <a16:creationId xmlns:a16="http://schemas.microsoft.com/office/drawing/2014/main" id="{4F645F3E-C499-4E9F-BD70-42230E9C5192}"/>
+                <a16:creationId xmlns:a16="http://schemas.microsoft.com/office/drawing/2014/main" id="{E428B2CF-3588-4B4A-B604-5B1590F65C55}"/>
               </a:ext>
             </a:extLst>
           </p:cNvPr>
@@ -4842,7 +5336,7 @@
           <a:p>
             <a:r>
               <a:rPr lang="en-GB" dirty="0"/>
-              <a:t>*Features of Game*</a:t>
+              <a:t>Where’s the fun?</a:t>
             </a:r>
           </a:p>
         </p:txBody>
@@ -4852,7 +5346,7 @@
           <p:cNvPr id="3" name="Content Placeholder 2">
             <a:extLst>
               <a:ext uri="{FF2B5EF4-FFF2-40B4-BE49-F238E27FC236}">
-                <a16:creationId xmlns:a16="http://schemas.microsoft.com/office/drawing/2014/main" id="{DE963656-DFBE-4E78-80AB-0A3D6F191D64}"/>
+                <a16:creationId xmlns:a16="http://schemas.microsoft.com/office/drawing/2014/main" id="{02CF3119-6179-40C4-A1C6-096CBD47D60E}"/>
               </a:ext>
             </a:extLst>
           </p:cNvPr>
@@ -4863,14 +5357,21 @@
             <p:ph idx="1"/>
           </p:nvPr>
         </p:nvSpPr>
-        <p:spPr/>
-        <p:txBody>
-          <a:bodyPr/>
-          <a:lstStyle/>
-          <a:p>
-            <a:r>
-              <a:rPr lang="en-GB" dirty="0"/>
-              <a:t>*Brief synopsis of all game’s current features and any currently planned for later builds (may link back to feedback/iterative cycle slide)*</a:t>
+        <p:spPr>
+          <a:xfrm>
+            <a:off x="838200" y="1798330"/>
+            <a:ext cx="10515600" cy="4351338"/>
+          </a:xfrm>
+        </p:spPr>
+        <p:txBody>
+          <a:bodyPr>
+            <a:normAutofit/>
+          </a:bodyPr>
+          <a:lstStyle/>
+          <a:p>
+            <a:r>
+              <a:rPr lang="en-GB" sz="3200" dirty="0"/>
+              <a:t>*Describe how game mechanics/theme relate to appropriate theory on fun; 4 keys 2 fun etc…*</a:t>
             </a:r>
           </a:p>
         </p:txBody>
@@ -4878,7 +5379,7 @@
     </p:spTree>
     <p:extLst>
       <p:ext uri="{BB962C8B-B14F-4D97-AF65-F5344CB8AC3E}">
-        <p14:creationId xmlns:p14="http://schemas.microsoft.com/office/powerpoint/2010/main" val="1528507122"/>
+        <p14:creationId xmlns:p14="http://schemas.microsoft.com/office/powerpoint/2010/main" val="345960583"/>
       </p:ext>
     </p:extLst>
   </p:cSld>

</xml_diff>

<commit_message>
Minor gramatical changes to Presentation Template
</commit_message>
<xml_diff>
--- a/Pitch Presentations/Second Pitch Template.pptx
+++ b/Pitch Presentations/Second Pitch Template.pptx
@@ -3653,7 +3653,31 @@
           <a:p>
             <a:r>
               <a:rPr lang="en-GB" dirty="0"/>
-              <a:t>*TEMPORARY SLIDE* - Only Purpose to Imbed custom colour scheme for later edits</a:t>
+              <a:t>*TEMPORARY SLIDE* - </a:t>
+            </a:r>
+            <a:r>
+              <a:rPr lang="en-GB"/>
+              <a:t>Only </a:t>
+            </a:r>
+            <a:r>
+              <a:rPr lang="en-GB" dirty="0"/>
+              <a:t>p</a:t>
+            </a:r>
+            <a:r>
+              <a:rPr lang="en-GB"/>
+              <a:t>urpose </a:t>
+            </a:r>
+            <a:r>
+              <a:rPr lang="en-GB" dirty="0"/>
+              <a:t>is </a:t>
+            </a:r>
+            <a:r>
+              <a:rPr lang="en-GB"/>
+              <a:t>to imbed </a:t>
+            </a:r>
+            <a:r>
+              <a:rPr lang="en-GB" dirty="0"/>
+              <a:t>custom colour scheme for later edits</a:t>
             </a:r>
           </a:p>
         </p:txBody>

</xml_diff>